<commit_message>
module 5 complete (?)
</commit_message>
<xml_diff>
--- a/slides/module5.pptx
+++ b/slides/module5.pptx
@@ -5,24 +5,26 @@
     <p:sldMasterId id="2147483660" r:id="rId4"/>
   </p:sldMasterIdLst>
   <p:notesMasterIdLst>
-    <p:notesMasterId r:id="rId17"/>
+    <p:notesMasterId r:id="rId19"/>
   </p:notesMasterIdLst>
   <p:handoutMasterIdLst>
-    <p:handoutMasterId r:id="rId18"/>
+    <p:handoutMasterId r:id="rId20"/>
   </p:handoutMasterIdLst>
   <p:sldIdLst>
     <p:sldId id="277" r:id="rId5"/>
     <p:sldId id="278" r:id="rId6"/>
-    <p:sldId id="296" r:id="rId7"/>
-    <p:sldId id="297" r:id="rId8"/>
-    <p:sldId id="304" r:id="rId9"/>
-    <p:sldId id="294" r:id="rId10"/>
-    <p:sldId id="302" r:id="rId11"/>
-    <p:sldId id="299" r:id="rId12"/>
-    <p:sldId id="295" r:id="rId13"/>
-    <p:sldId id="303" r:id="rId14"/>
-    <p:sldId id="301" r:id="rId15"/>
-    <p:sldId id="269" r:id="rId16"/>
+    <p:sldId id="312" r:id="rId7"/>
+    <p:sldId id="295" r:id="rId8"/>
+    <p:sldId id="310" r:id="rId9"/>
+    <p:sldId id="303" r:id="rId10"/>
+    <p:sldId id="301" r:id="rId11"/>
+    <p:sldId id="307" r:id="rId12"/>
+    <p:sldId id="296" r:id="rId13"/>
+    <p:sldId id="297" r:id="rId14"/>
+    <p:sldId id="304" r:id="rId15"/>
+    <p:sldId id="299" r:id="rId16"/>
+    <p:sldId id="305" r:id="rId17"/>
+    <p:sldId id="269" r:id="rId18"/>
   </p:sldIdLst>
   <p:sldSz cx="12192000" cy="6858000"/>
   <p:notesSz cx="6858000" cy="9144000"/>
@@ -123,10 +125,10 @@
   </p:defaultTextStyle>
   <p:extLst>
     <p:ext uri="{EFAFB233-063F-42B5-8137-9DF3F51BA10A}">
-      <p15:sldGuideLst xmlns="" xmlns:p15="http://schemas.microsoft.com/office/powerpoint/2012/main"/>
+      <p15:sldGuideLst xmlns:p15="http://schemas.microsoft.com/office/powerpoint/2012/main" xmlns=""/>
     </p:ext>
     <p:ext uri="{2D200454-40CA-4A62-9FC3-DE9A4176ACB9}">
-      <p15:notesGuideLst xmlns="" xmlns:p15="http://schemas.microsoft.com/office/powerpoint/2012/main"/>
+      <p15:notesGuideLst xmlns:p15="http://schemas.microsoft.com/office/powerpoint/2012/main" xmlns=""/>
     </p:ext>
   </p:extLst>
 </p:presentation>
@@ -1223,7 +1225,7 @@
   </p:timing>
   <p:extLst mod="1">
     <p:ext uri="{DCECCB84-F9BA-43D5-87BE-67443E8EF086}">
-      <p15:sldGuideLst xmlns="" xmlns:p15="http://schemas.microsoft.com/office/powerpoint/2012/main">
+      <p15:sldGuideLst xmlns:p15="http://schemas.microsoft.com/office/powerpoint/2012/main" xmlns="">
         <p15:guide id="1" orient="horz" pos="3792">
           <p15:clr>
             <a:srgbClr val="FBAE40"/>
@@ -1882,7 +1884,7 @@
   </p:timing>
   <p:extLst mod="1">
     <p:ext uri="{DCECCB84-F9BA-43D5-87BE-67443E8EF086}">
-      <p15:sldGuideLst xmlns="" xmlns:p15="http://schemas.microsoft.com/office/powerpoint/2012/main">
+      <p15:sldGuideLst xmlns:p15="http://schemas.microsoft.com/office/powerpoint/2012/main" xmlns="">
         <p15:guide id="1" orient="horz" pos="2160">
           <p15:clr>
             <a:srgbClr val="FBAE40"/>
@@ -3697,7 +3699,7 @@
           <a:p>
             <a:r>
               <a:rPr lang="en-US" dirty="0" smtClean="0"/>
-              <a:t>Saving authentication status</a:t>
+              <a:t>Services</a:t>
             </a:r>
             <a:endParaRPr lang="en-US" dirty="0"/>
           </a:p>
@@ -3720,28 +3722,46 @@
           <a:p>
             <a:r>
               <a:rPr lang="en-US" dirty="0" smtClean="0"/>
-              <a:t>Save authentication through $</a:t>
-            </a:r>
-            <a:r>
-              <a:rPr lang="en-US" dirty="0" err="1" smtClean="0"/>
-              <a:t>rootScope</a:t>
-            </a:r>
+              <a:t>Organizes logic</a:t>
+            </a:r>
+          </a:p>
+          <a:p>
+            <a:endParaRPr lang="en-US" dirty="0" smtClean="0"/>
+          </a:p>
+          <a:p>
+            <a:r>
+              <a:rPr lang="en-US" dirty="0" smtClean="0"/>
+              <a:t>Persists data outside of controllers</a:t>
+            </a:r>
+          </a:p>
+          <a:p>
+            <a:endParaRPr lang="en-US" dirty="0" smtClean="0"/>
+          </a:p>
+          <a:p>
+            <a:r>
+              <a:rPr lang="en-US" dirty="0" smtClean="0"/>
+              <a:t>Share data between controllers</a:t>
+            </a:r>
+          </a:p>
+          <a:p>
+            <a:endParaRPr lang="en-US" dirty="0" smtClean="0"/>
+          </a:p>
+          <a:p>
+            <a:r>
+              <a:rPr lang="en-US" dirty="0" smtClean="0"/>
+              <a:t>Injected as you need them</a:t>
+            </a:r>
+          </a:p>
+          <a:p>
+            <a:endParaRPr lang="en-US" dirty="0"/>
+          </a:p>
+          <a:p>
+            <a:pPr marL="0" indent="0">
+              <a:buNone/>
+            </a:pPr>
             <a:r>
               <a:rPr lang="en-US" dirty="0" smtClean="0"/>
               <a:t> </a:t>
-            </a:r>
-          </a:p>
-          <a:p>
-            <a:endParaRPr lang="en-US" dirty="0"/>
-          </a:p>
-          <a:p>
-            <a:r>
-              <a:rPr lang="en-US" dirty="0" smtClean="0"/>
-              <a:t>Show/hide elements based on </a:t>
-            </a:r>
-            <a:r>
-              <a:rPr lang="en-US" smtClean="0"/>
-              <a:t>authentication status</a:t>
             </a:r>
             <a:endParaRPr lang="en-US" dirty="0"/>
           </a:p>
@@ -3750,7 +3770,7 @@
     </p:spTree>
     <p:extLst>
       <p:ext uri="{BB962C8B-B14F-4D97-AF65-F5344CB8AC3E}">
-        <p14:creationId xmlns:p14="http://schemas.microsoft.com/office/powerpoint/2010/main" val="2049257353"/>
+        <p14:creationId xmlns:p14="http://schemas.microsoft.com/office/powerpoint/2010/main" val="2224696552"/>
       </p:ext>
     </p:extLst>
   </p:cSld>
@@ -3794,7 +3814,7 @@
           <a:p>
             <a:r>
               <a:rPr lang="en-US" dirty="0" smtClean="0"/>
-              <a:t>Redirecting the user</a:t>
+              <a:t>Various Services</a:t>
             </a:r>
             <a:endParaRPr lang="en-US" dirty="0"/>
           </a:p>
@@ -3817,24 +3837,75 @@
           <a:p>
             <a:r>
               <a:rPr lang="en-US" dirty="0" smtClean="0"/>
-              <a:t>Check the authentication status</a:t>
-            </a:r>
-          </a:p>
-          <a:p>
+              <a:t>Factory</a:t>
+            </a:r>
+          </a:p>
+          <a:p>
+            <a:pPr lvl="1"/>
+            <a:r>
+              <a:rPr lang="en-US" dirty="0" smtClean="0"/>
+              <a:t>Receive the value returned</a:t>
+            </a:r>
             <a:endParaRPr lang="en-US" dirty="0"/>
           </a:p>
           <a:p>
-            <a:r>
-              <a:rPr lang="en-US" dirty="0" smtClean="0"/>
-              <a:t>Use $location to change the URL and redirect user</a:t>
-            </a:r>
+            <a:pPr lvl="1"/>
+            <a:r>
+              <a:rPr lang="en-US" dirty="0" smtClean="0"/>
+              <a:t>Useful for reusing logic different controllers</a:t>
+            </a:r>
+          </a:p>
+          <a:p>
+            <a:r>
+              <a:rPr lang="en-US" dirty="0" smtClean="0"/>
+              <a:t>Service</a:t>
+            </a:r>
+          </a:p>
+          <a:p>
+            <a:pPr lvl="1"/>
+            <a:r>
+              <a:rPr lang="en-US" dirty="0" smtClean="0"/>
+              <a:t>Receive a </a:t>
+            </a:r>
+            <a:r>
+              <a:rPr lang="en-US" dirty="0"/>
+              <a:t>new instance of created object</a:t>
+            </a:r>
+          </a:p>
+          <a:p>
+            <a:pPr lvl="1"/>
+            <a:r>
+              <a:rPr lang="en-US" dirty="0" smtClean="0"/>
+              <a:t>Useful for sharing information between objects</a:t>
+            </a:r>
+          </a:p>
+          <a:p>
+            <a:r>
+              <a:rPr lang="en-US" dirty="0" smtClean="0"/>
+              <a:t>Provider</a:t>
+            </a:r>
+          </a:p>
+          <a:p>
+            <a:pPr lvl="1"/>
+            <a:r>
+              <a:rPr lang="en-US" dirty="0" smtClean="0"/>
+              <a:t>Versatile but verbose</a:t>
+            </a:r>
+          </a:p>
+          <a:p>
+            <a:pPr lvl="1"/>
+            <a:r>
+              <a:rPr lang="en-US" dirty="0" smtClean="0"/>
+              <a:t>Useful for an API that needs to be configured before app starts</a:t>
+            </a:r>
+            <a:endParaRPr lang="en-US" dirty="0"/>
           </a:p>
         </p:txBody>
       </p:sp>
     </p:spTree>
     <p:extLst>
       <p:ext uri="{BB962C8B-B14F-4D97-AF65-F5344CB8AC3E}">
-        <p14:creationId xmlns:p14="http://schemas.microsoft.com/office/powerpoint/2010/main" val="3806772578"/>
+        <p14:creationId xmlns:p14="http://schemas.microsoft.com/office/powerpoint/2010/main" val="715418274"/>
       </p:ext>
     </p:extLst>
   </p:cSld>
@@ -3845,6 +3916,174 @@
 </file>
 
 <file path=ppt/slides/slide12.xml><?xml version="1.0" encoding="utf-8"?>
+<p:sld xmlns:a="http://schemas.openxmlformats.org/drawingml/2006/main" xmlns:r="http://schemas.openxmlformats.org/officeDocument/2006/relationships" xmlns:p="http://schemas.openxmlformats.org/presentationml/2006/main">
+  <p:cSld>
+    <p:spTree>
+      <p:nvGrpSpPr>
+        <p:cNvPr id="1" name=""/>
+        <p:cNvGrpSpPr/>
+        <p:nvPr/>
+      </p:nvGrpSpPr>
+      <p:grpSpPr>
+        <a:xfrm>
+          <a:off x="0" y="0"/>
+          <a:ext cx="0" cy="0"/>
+          <a:chOff x="0" y="0"/>
+          <a:chExt cx="0" cy="0"/>
+        </a:xfrm>
+      </p:grpSpPr>
+      <p:sp>
+        <p:nvSpPr>
+          <p:cNvPr id="2" name="Title 1"/>
+          <p:cNvSpPr>
+            <a:spLocks noGrp="1"/>
+          </p:cNvSpPr>
+          <p:nvPr>
+            <p:ph type="title"/>
+          </p:nvPr>
+        </p:nvSpPr>
+        <p:spPr/>
+        <p:txBody>
+          <a:bodyPr/>
+          <a:lstStyle/>
+          <a:p>
+            <a:r>
+              <a:rPr lang="en-US" dirty="0" smtClean="0"/>
+              <a:t>$resource</a:t>
+            </a:r>
+            <a:endParaRPr lang="en-US" dirty="0"/>
+          </a:p>
+        </p:txBody>
+      </p:sp>
+      <p:sp>
+        <p:nvSpPr>
+          <p:cNvPr id="3" name="Content Placeholder 2"/>
+          <p:cNvSpPr>
+            <a:spLocks noGrp="1"/>
+          </p:cNvSpPr>
+          <p:nvPr>
+            <p:ph sz="quarter" idx="10"/>
+          </p:nvPr>
+        </p:nvSpPr>
+        <p:spPr/>
+        <p:txBody>
+          <a:bodyPr/>
+          <a:lstStyle/>
+          <a:p>
+            <a:r>
+              <a:rPr lang="en-US" dirty="0" smtClean="0"/>
+              <a:t>No need for manual $http interactions</a:t>
+            </a:r>
+            <a:endParaRPr lang="en-US" dirty="0"/>
+          </a:p>
+          <a:p>
+            <a:endParaRPr lang="en-US" dirty="0" smtClean="0"/>
+          </a:p>
+          <a:p>
+            <a:r>
+              <a:rPr lang="en-US" dirty="0" smtClean="0"/>
+              <a:t>Easiest way to interact with </a:t>
+            </a:r>
+            <a:r>
+              <a:rPr lang="en-US" dirty="0" err="1" smtClean="0"/>
+              <a:t>RESTful</a:t>
+            </a:r>
+            <a:r>
+              <a:rPr lang="en-US" dirty="0" smtClean="0"/>
+              <a:t> endpoints</a:t>
+            </a:r>
+          </a:p>
+          <a:p>
+            <a:endParaRPr lang="en-US" dirty="0" smtClean="0"/>
+          </a:p>
+          <a:p>
+            <a:r>
+              <a:rPr lang="en-US" dirty="0" smtClean="0"/>
+              <a:t>Requires the </a:t>
+            </a:r>
+            <a:r>
+              <a:rPr lang="en-US" dirty="0" err="1" smtClean="0"/>
+              <a:t>ngResource</a:t>
+            </a:r>
+            <a:r>
+              <a:rPr lang="en-US" dirty="0" smtClean="0"/>
+              <a:t> module</a:t>
+            </a:r>
+          </a:p>
+          <a:p>
+            <a:endParaRPr lang="en-US" dirty="0"/>
+          </a:p>
+          <a:p>
+            <a:endParaRPr lang="en-US" dirty="0" smtClean="0"/>
+          </a:p>
+          <a:p>
+            <a:endParaRPr lang="en-US" dirty="0"/>
+          </a:p>
+        </p:txBody>
+      </p:sp>
+    </p:spTree>
+    <p:extLst>
+      <p:ext uri="{BB962C8B-B14F-4D97-AF65-F5344CB8AC3E}">
+        <p14:creationId xmlns:p14="http://schemas.microsoft.com/office/powerpoint/2010/main" val="444165021"/>
+      </p:ext>
+    </p:extLst>
+  </p:cSld>
+  <p:clrMapOvr>
+    <a:masterClrMapping/>
+  </p:clrMapOvr>
+</p:sld>
+</file>
+
+<file path=ppt/slides/slide13.xml><?xml version="1.0" encoding="utf-8"?>
+<p:sld xmlns:a="http://schemas.openxmlformats.org/drawingml/2006/main" xmlns:r="http://schemas.openxmlformats.org/officeDocument/2006/relationships" xmlns:p="http://schemas.openxmlformats.org/presentationml/2006/main">
+  <p:cSld>
+    <p:spTree>
+      <p:nvGrpSpPr>
+        <p:cNvPr id="1" name=""/>
+        <p:cNvGrpSpPr/>
+        <p:nvPr/>
+      </p:nvGrpSpPr>
+      <p:grpSpPr>
+        <a:xfrm>
+          <a:off x="0" y="0"/>
+          <a:ext cx="0" cy="0"/>
+          <a:chOff x="0" y="0"/>
+          <a:chExt cx="0" cy="0"/>
+        </a:xfrm>
+      </p:grpSpPr>
+      <p:sp>
+        <p:nvSpPr>
+          <p:cNvPr id="2" name="Title 1"/>
+          <p:cNvSpPr>
+            <a:spLocks noGrp="1"/>
+          </p:cNvSpPr>
+          <p:nvPr>
+            <p:ph type="title"/>
+          </p:nvPr>
+        </p:nvSpPr>
+        <p:spPr/>
+        <p:txBody>
+          <a:bodyPr/>
+          <a:lstStyle/>
+          <a:p>
+            <a:endParaRPr lang="en-US"/>
+          </a:p>
+        </p:txBody>
+      </p:sp>
+    </p:spTree>
+    <p:extLst>
+      <p:ext uri="{BB962C8B-B14F-4D97-AF65-F5344CB8AC3E}">
+        <p14:creationId xmlns:p14="http://schemas.microsoft.com/office/powerpoint/2010/main" val="2904506000"/>
+      </p:ext>
+    </p:extLst>
+  </p:cSld>
+  <p:clrMapOvr>
+    <a:masterClrMapping/>
+  </p:clrMapOvr>
+</p:sld>
+</file>
+
+<file path=ppt/slides/slide14.xml><?xml version="1.0" encoding="utf-8"?>
 <p:sld xmlns:a="http://schemas.openxmlformats.org/drawingml/2006/main" xmlns:r="http://schemas.openxmlformats.org/officeDocument/2006/relationships" xmlns:p="http://schemas.openxmlformats.org/presentationml/2006/main">
   <p:cSld>
     <p:spTree>
@@ -3913,15 +4152,13 @@
           </a:bodyPr>
           <a:lstStyle/>
           <a:p>
-            <a:pPr marL="0" indent="0">
-              <a:buNone/>
-            </a:pPr>
-            <a:endParaRPr lang="en-GB" dirty="0" smtClean="0"/>
-          </a:p>
-          <a:p>
             <a:r>
               <a:rPr lang="en-GB" dirty="0" smtClean="0"/>
-              <a:t>Using our Angular app as the </a:t>
+              <a:t>Using </a:t>
+            </a:r>
+            <a:r>
+              <a:rPr lang="en-GB" dirty="0" smtClean="0"/>
+              <a:t>our Angular app as the </a:t>
             </a:r>
             <a:r>
               <a:rPr lang="en-GB" dirty="0" smtClean="0"/>
@@ -3929,26 +4166,17 @@
             </a:r>
           </a:p>
           <a:p>
-            <a:endParaRPr lang="en-GB"/>
-          </a:p>
-          <a:p>
-            <a:r>
-              <a:rPr lang="en-GB" smtClean="0"/>
-              <a:t>Adding </a:t>
-            </a:r>
-            <a:r>
-              <a:rPr lang="en-GB" dirty="0" err="1" smtClean="0"/>
-              <a:t>Angular.js</a:t>
-            </a:r>
-            <a:r>
-              <a:rPr lang="en-GB" dirty="0" smtClean="0"/>
-              <a:t> </a:t>
-            </a:r>
-            <a:r>
-              <a:rPr lang="en-GB" dirty="0" smtClean="0"/>
-              <a:t>Services</a:t>
-            </a:r>
-            <a:endParaRPr lang="en-GB" dirty="0"/>
+            <a:endParaRPr lang="en-US" dirty="0" smtClean="0"/>
+          </a:p>
+          <a:p>
+            <a:r>
+              <a:rPr lang="en-US" smtClean="0"/>
+              <a:t>Calling APIs </a:t>
+            </a:r>
+            <a:r>
+              <a:rPr lang="en-US" dirty="0"/>
+              <a:t>&amp; Displaying Authentication</a:t>
+            </a:r>
           </a:p>
           <a:p>
             <a:pPr marL="0" indent="0">
@@ -3959,25 +4187,29 @@
           <a:p>
             <a:r>
               <a:rPr lang="en-GB" dirty="0" smtClean="0"/>
-              <a:t>Accessing APIs from Angular</a:t>
-            </a:r>
-            <a:endParaRPr lang="en-US" dirty="0" smtClean="0"/>
+              <a:t>Adding </a:t>
+            </a:r>
+            <a:r>
+              <a:rPr lang="en-GB" dirty="0" err="1" smtClean="0"/>
+              <a:t>Angular.js</a:t>
+            </a:r>
+            <a:r>
+              <a:rPr lang="en-GB" dirty="0" smtClean="0"/>
+              <a:t> Services</a:t>
+            </a:r>
+            <a:endParaRPr lang="en-GB" dirty="0"/>
+          </a:p>
+          <a:p>
+            <a:pPr marL="0" indent="0">
+              <a:buNone/>
+            </a:pPr>
+            <a:endParaRPr lang="en-GB" dirty="0"/>
           </a:p>
           <a:p>
             <a:pPr marL="0" indent="0">
               <a:buNone/>
             </a:pPr>
             <a:endParaRPr lang="en-US" dirty="0" smtClean="0"/>
-          </a:p>
-          <a:p>
-            <a:r>
-              <a:rPr lang="en-US" dirty="0" smtClean="0"/>
-              <a:t>Implementing </a:t>
-            </a:r>
-            <a:r>
-              <a:rPr lang="en-US" dirty="0"/>
-              <a:t>&amp; Displaying Authentication</a:t>
-            </a:r>
           </a:p>
           <a:p>
             <a:pPr marL="0" indent="0">
@@ -4076,12 +4308,12 @@
       </p:grpSpPr>
       <p:sp>
         <p:nvSpPr>
-          <p:cNvPr id="5" name="Text Placeholder 4"/>
+          <p:cNvPr id="2" name="Title 1"/>
           <p:cNvSpPr>
             <a:spLocks noGrp="1"/>
           </p:cNvSpPr>
           <p:nvPr>
-            <p:ph type="body" sz="quarter" idx="10"/>
+            <p:ph type="title"/>
           </p:nvPr>
         </p:nvSpPr>
         <p:spPr/>
@@ -4089,37 +4321,14 @@
           <a:bodyPr/>
           <a:lstStyle/>
           <a:p>
-            <a:r>
-              <a:rPr lang="en-US" dirty="0" smtClean="0"/>
-              <a:t>Services</a:t>
-            </a:r>
-            <a:endParaRPr lang="en-US" dirty="0"/>
-          </a:p>
-        </p:txBody>
-      </p:sp>
-      <p:sp>
-        <p:nvSpPr>
-          <p:cNvPr id="4" name="Subtitle 3"/>
-          <p:cNvSpPr>
-            <a:spLocks noGrp="1"/>
-          </p:cNvSpPr>
-          <p:nvPr>
-            <p:ph type="subTitle" idx="1"/>
-          </p:nvPr>
-        </p:nvSpPr>
-        <p:spPr/>
-        <p:txBody>
-          <a:bodyPr/>
-          <a:lstStyle/>
-          <a:p>
-            <a:endParaRPr lang="en-US" dirty="0"/>
+            <a:endParaRPr lang="en-US"/>
           </a:p>
         </p:txBody>
       </p:sp>
     </p:spTree>
     <p:extLst>
       <p:ext uri="{BB962C8B-B14F-4D97-AF65-F5344CB8AC3E}">
-        <p14:creationId xmlns:p14="http://schemas.microsoft.com/office/powerpoint/2010/main" val="1868946462"/>
+        <p14:creationId xmlns:p14="http://schemas.microsoft.com/office/powerpoint/2010/main" val="2923501581"/>
       </p:ext>
     </p:extLst>
   </p:cSld>
@@ -4148,12 +4357,12 @@
       </p:grpSpPr>
       <p:sp>
         <p:nvSpPr>
-          <p:cNvPr id="2" name="Title 1"/>
+          <p:cNvPr id="2" name="Text Placeholder 1"/>
           <p:cNvSpPr>
             <a:spLocks noGrp="1"/>
           </p:cNvSpPr>
           <p:nvPr>
-            <p:ph type="title"/>
+            <p:ph type="body" sz="quarter" idx="10"/>
           </p:nvPr>
         </p:nvSpPr>
         <p:spPr/>
@@ -4163,7 +4372,7 @@
           <a:p>
             <a:r>
               <a:rPr lang="en-US" dirty="0" smtClean="0"/>
-              <a:t>Services</a:t>
+              <a:t>Implementing &amp; Displaying Authentication</a:t>
             </a:r>
             <a:endParaRPr lang="en-US" dirty="0"/>
           </a:p>
@@ -4171,12 +4380,12 @@
       </p:sp>
       <p:sp>
         <p:nvSpPr>
-          <p:cNvPr id="3" name="Content Placeholder 2"/>
+          <p:cNvPr id="3" name="Subtitle 2"/>
           <p:cNvSpPr>
             <a:spLocks noGrp="1"/>
           </p:cNvSpPr>
           <p:nvPr>
-            <p:ph sz="quarter" idx="10"/>
+            <p:ph type="subTitle" idx="1"/>
           </p:nvPr>
         </p:nvSpPr>
         <p:spPr/>
@@ -4184,57 +4393,14 @@
           <a:bodyPr/>
           <a:lstStyle/>
           <a:p>
-            <a:r>
-              <a:rPr lang="en-US" dirty="0" smtClean="0"/>
-              <a:t>Organizes logic</a:t>
-            </a:r>
-          </a:p>
-          <a:p>
-            <a:endParaRPr lang="en-US" dirty="0" smtClean="0"/>
-          </a:p>
-          <a:p>
-            <a:r>
-              <a:rPr lang="en-US" dirty="0" smtClean="0"/>
-              <a:t>Persists data outside of controllers</a:t>
-            </a:r>
-          </a:p>
-          <a:p>
-            <a:endParaRPr lang="en-US" dirty="0" smtClean="0"/>
-          </a:p>
-          <a:p>
-            <a:r>
-              <a:rPr lang="en-US" dirty="0" smtClean="0"/>
-              <a:t>Share data between controllers</a:t>
-            </a:r>
-          </a:p>
-          <a:p>
-            <a:endParaRPr lang="en-US" dirty="0" smtClean="0"/>
-          </a:p>
-          <a:p>
-            <a:r>
-              <a:rPr lang="en-US" dirty="0" smtClean="0"/>
-              <a:t>Injected as you need them</a:t>
-            </a:r>
-          </a:p>
-          <a:p>
-            <a:endParaRPr lang="en-US" dirty="0"/>
-          </a:p>
-          <a:p>
-            <a:pPr marL="0" indent="0">
-              <a:buNone/>
-            </a:pPr>
-            <a:r>
-              <a:rPr lang="en-US" dirty="0" smtClean="0"/>
-              <a:t> </a:t>
-            </a:r>
-            <a:endParaRPr lang="en-US" dirty="0"/>
+            <a:endParaRPr lang="en-US"/>
           </a:p>
         </p:txBody>
       </p:sp>
     </p:spTree>
     <p:extLst>
       <p:ext uri="{BB962C8B-B14F-4D97-AF65-F5344CB8AC3E}">
-        <p14:creationId xmlns:p14="http://schemas.microsoft.com/office/powerpoint/2010/main" val="2224696552"/>
+        <p14:creationId xmlns:p14="http://schemas.microsoft.com/office/powerpoint/2010/main" val="3710274791"/>
       </p:ext>
     </p:extLst>
   </p:cSld>
@@ -4278,7 +4444,7 @@
           <a:p>
             <a:r>
               <a:rPr lang="en-US" dirty="0" smtClean="0"/>
-              <a:t>Various Services</a:t>
+              <a:t>$http</a:t>
             </a:r>
             <a:endParaRPr lang="en-US" dirty="0"/>
           </a:p>
@@ -4301,66 +4467,106 @@
           <a:p>
             <a:r>
               <a:rPr lang="en-US" dirty="0" smtClean="0"/>
-              <a:t>Factory</a:t>
-            </a:r>
+              <a:t>Core Angular service</a:t>
+            </a:r>
+          </a:p>
+          <a:p>
+            <a:r>
+              <a:rPr lang="en-US" dirty="0" smtClean="0"/>
+              <a:t>Returns a promise with success and error callbacks </a:t>
+            </a:r>
+          </a:p>
+          <a:p>
+            <a:r>
+              <a:rPr lang="en-US" dirty="0"/>
+              <a:t>$</a:t>
+            </a:r>
+            <a:r>
+              <a:rPr lang="en-US" dirty="0" err="1"/>
+              <a:t>http.get</a:t>
+            </a:r>
+            <a:r>
+              <a:rPr lang="en-US" dirty="0"/>
+              <a:t>('/</a:t>
+            </a:r>
+            <a:r>
+              <a:rPr lang="en-US" dirty="0" err="1"/>
+              <a:t>someUrl</a:t>
+            </a:r>
+            <a:r>
+              <a:rPr lang="en-US" dirty="0"/>
+              <a:t>').success(</a:t>
+            </a:r>
+            <a:r>
+              <a:rPr lang="en-US" dirty="0" err="1"/>
+              <a:t>successCallback</a:t>
+            </a:r>
+            <a:r>
+              <a:rPr lang="en-US" dirty="0"/>
+              <a:t>);</a:t>
+            </a:r>
+            <a:endParaRPr lang="en-US" dirty="0" smtClean="0"/>
+          </a:p>
+          <a:p>
+            <a:endParaRPr lang="en-US" dirty="0" smtClean="0"/>
           </a:p>
           <a:p>
             <a:pPr lvl="1"/>
             <a:r>
-              <a:rPr lang="en-US" dirty="0" smtClean="0"/>
-              <a:t>Receive the value returned</a:t>
+              <a:rPr lang="en-US" dirty="0"/>
+              <a:t>$</a:t>
+            </a:r>
+            <a:r>
+              <a:rPr lang="en-US" dirty="0" err="1"/>
+              <a:t>http.get</a:t>
             </a:r>
             <a:endParaRPr lang="en-US" dirty="0"/>
           </a:p>
           <a:p>
             <a:pPr lvl="1"/>
             <a:r>
-              <a:rPr lang="en-US" dirty="0" smtClean="0"/>
-              <a:t>Useful for reusing logic different controllers</a:t>
-            </a:r>
-          </a:p>
-          <a:p>
-            <a:r>
-              <a:rPr lang="en-US" dirty="0" smtClean="0"/>
-              <a:t>Service</a:t>
-            </a:r>
+              <a:rPr lang="en-US" dirty="0"/>
+              <a:t>$</a:t>
+            </a:r>
+            <a:r>
+              <a:rPr lang="en-US" dirty="0" err="1"/>
+              <a:t>http.head</a:t>
+            </a:r>
+            <a:endParaRPr lang="en-US" dirty="0"/>
           </a:p>
           <a:p>
             <a:pPr lvl="1"/>
             <a:r>
-              <a:rPr lang="en-US" dirty="0" smtClean="0"/>
-              <a:t>Receive a </a:t>
-            </a:r>
-            <a:r>
               <a:rPr lang="en-US" dirty="0"/>
-              <a:t>new instance of created object</a:t>
-            </a:r>
+              <a:t>$</a:t>
+            </a:r>
+            <a:r>
+              <a:rPr lang="en-US" dirty="0" err="1"/>
+              <a:t>http.post</a:t>
+            </a:r>
+            <a:endParaRPr lang="en-US" dirty="0"/>
           </a:p>
           <a:p>
             <a:pPr lvl="1"/>
             <a:r>
-              <a:rPr lang="en-US" dirty="0" smtClean="0"/>
-              <a:t>Useful for sharing information between objects</a:t>
-            </a:r>
-          </a:p>
-          <a:p>
-            <a:r>
-              <a:rPr lang="en-US" dirty="0" smtClean="0"/>
-              <a:t>Provider</a:t>
-            </a:r>
+              <a:rPr lang="en-US" dirty="0"/>
+              <a:t>$</a:t>
+            </a:r>
+            <a:r>
+              <a:rPr lang="en-US" dirty="0" err="1"/>
+              <a:t>http.put</a:t>
+            </a:r>
+            <a:endParaRPr lang="en-US" dirty="0"/>
           </a:p>
           <a:p>
             <a:pPr lvl="1"/>
             <a:r>
-              <a:rPr lang="en-US" dirty="0" smtClean="0"/>
-              <a:t>Versatile but verbose</a:t>
-            </a:r>
-          </a:p>
-          <a:p>
-            <a:pPr lvl="1"/>
-            <a:r>
-              <a:rPr lang="en-US" dirty="0" smtClean="0"/>
-              <a:t>Useful for an API that needs to be configured before app starts</a:t>
+              <a:rPr lang="en-US" dirty="0"/>
+              <a:t>$</a:t>
+            </a:r>
+            <a:r>
+              <a:rPr lang="en-US" dirty="0" err="1" smtClean="0"/>
+              <a:t>http.delete</a:t>
             </a:r>
             <a:endParaRPr lang="en-US" dirty="0"/>
           </a:p>
@@ -4369,7 +4575,7 @@
     </p:spTree>
     <p:extLst>
       <p:ext uri="{BB962C8B-B14F-4D97-AF65-F5344CB8AC3E}">
-        <p14:creationId xmlns:p14="http://schemas.microsoft.com/office/powerpoint/2010/main" val="715418274"/>
+        <p14:creationId xmlns:p14="http://schemas.microsoft.com/office/powerpoint/2010/main" val="818124420"/>
       </p:ext>
     </p:extLst>
   </p:cSld>
@@ -4398,12 +4604,12 @@
       </p:grpSpPr>
       <p:sp>
         <p:nvSpPr>
-          <p:cNvPr id="2" name="Text Placeholder 1"/>
+          <p:cNvPr id="2" name="Title 1"/>
           <p:cNvSpPr>
             <a:spLocks noGrp="1"/>
           </p:cNvSpPr>
           <p:nvPr>
-            <p:ph type="body" sz="quarter" idx="10"/>
+            <p:ph type="title"/>
           </p:nvPr>
         </p:nvSpPr>
         <p:spPr/>
@@ -4413,7 +4619,7 @@
           <a:p>
             <a:r>
               <a:rPr lang="en-US" dirty="0" smtClean="0"/>
-              <a:t>Calling APIs from Angular</a:t>
+              <a:t>Saving authentication status</a:t>
             </a:r>
             <a:endParaRPr lang="en-US" dirty="0"/>
           </a:p>
@@ -4421,12 +4627,12 @@
       </p:sp>
       <p:sp>
         <p:nvSpPr>
-          <p:cNvPr id="3" name="Subtitle 2"/>
+          <p:cNvPr id="3" name="Content Placeholder 2"/>
           <p:cNvSpPr>
             <a:spLocks noGrp="1"/>
           </p:cNvSpPr>
           <p:nvPr>
-            <p:ph type="subTitle" idx="1"/>
+            <p:ph sz="quarter" idx="10"/>
           </p:nvPr>
         </p:nvSpPr>
         <p:spPr/>
@@ -4434,14 +4640,39 @@
           <a:bodyPr/>
           <a:lstStyle/>
           <a:p>
-            <a:endParaRPr lang="en-US"/>
+            <a:r>
+              <a:rPr lang="en-US" dirty="0" smtClean="0"/>
+              <a:t>Save authentication through $</a:t>
+            </a:r>
+            <a:r>
+              <a:rPr lang="en-US" dirty="0" err="1" smtClean="0"/>
+              <a:t>rootScope</a:t>
+            </a:r>
+            <a:r>
+              <a:rPr lang="en-US" dirty="0" smtClean="0"/>
+              <a:t> </a:t>
+            </a:r>
+          </a:p>
+          <a:p>
+            <a:endParaRPr lang="en-US" dirty="0"/>
+          </a:p>
+          <a:p>
+            <a:r>
+              <a:rPr lang="en-US" dirty="0" smtClean="0"/>
+              <a:t>Show/hide elements based on </a:t>
+            </a:r>
+            <a:r>
+              <a:rPr lang="en-US" smtClean="0"/>
+              <a:t>authentication status</a:t>
+            </a:r>
+            <a:endParaRPr lang="en-US" dirty="0"/>
           </a:p>
         </p:txBody>
       </p:sp>
     </p:spTree>
     <p:extLst>
       <p:ext uri="{BB962C8B-B14F-4D97-AF65-F5344CB8AC3E}">
-        <p14:creationId xmlns:p14="http://schemas.microsoft.com/office/powerpoint/2010/main" val="1442527289"/>
+        <p14:creationId xmlns:p14="http://schemas.microsoft.com/office/powerpoint/2010/main" val="2049257353"/>
       </p:ext>
     </p:extLst>
   </p:cSld>
@@ -4485,7 +4716,7 @@
           <a:p>
             <a:r>
               <a:rPr lang="en-US" dirty="0" smtClean="0"/>
-              <a:t>$http</a:t>
+              <a:t>Redirecting the user</a:t>
             </a:r>
             <a:endParaRPr lang="en-US" dirty="0"/>
           </a:p>
@@ -4508,115 +4739,24 @@
           <a:p>
             <a:r>
               <a:rPr lang="en-US" dirty="0" smtClean="0"/>
-              <a:t>Core Angular service</a:t>
-            </a:r>
-          </a:p>
-          <a:p>
-            <a:r>
-              <a:rPr lang="en-US" dirty="0" smtClean="0"/>
-              <a:t>Returns a promise with success and error callbacks </a:t>
-            </a:r>
-          </a:p>
-          <a:p>
-            <a:r>
-              <a:rPr lang="en-US" dirty="0"/>
-              <a:t>$</a:t>
-            </a:r>
-            <a:r>
-              <a:rPr lang="en-US" dirty="0" err="1"/>
-              <a:t>http.get</a:t>
-            </a:r>
-            <a:r>
-              <a:rPr lang="en-US" dirty="0"/>
-              <a:t>('/</a:t>
-            </a:r>
-            <a:r>
-              <a:rPr lang="en-US" dirty="0" err="1"/>
-              <a:t>someUrl</a:t>
-            </a:r>
-            <a:r>
-              <a:rPr lang="en-US" dirty="0"/>
-              <a:t>').success(</a:t>
-            </a:r>
-            <a:r>
-              <a:rPr lang="en-US" dirty="0" err="1"/>
-              <a:t>successCallback</a:t>
-            </a:r>
-            <a:r>
-              <a:rPr lang="en-US" dirty="0"/>
-              <a:t>);</a:t>
-            </a:r>
-            <a:endParaRPr lang="en-US" dirty="0" smtClean="0"/>
-          </a:p>
-          <a:p>
-            <a:endParaRPr lang="en-US" dirty="0" smtClean="0"/>
-          </a:p>
-          <a:p>
-            <a:pPr lvl="1"/>
-            <a:r>
-              <a:rPr lang="en-US" dirty="0"/>
-              <a:t>$</a:t>
-            </a:r>
-            <a:r>
-              <a:rPr lang="en-US" dirty="0" err="1"/>
-              <a:t>http.get</a:t>
-            </a:r>
+              <a:t>Check the authentication status</a:t>
+            </a:r>
+          </a:p>
+          <a:p>
             <a:endParaRPr lang="en-US" dirty="0"/>
           </a:p>
           <a:p>
-            <a:pPr lvl="1"/>
-            <a:r>
-              <a:rPr lang="en-US" dirty="0"/>
-              <a:t>$</a:t>
-            </a:r>
-            <a:r>
-              <a:rPr lang="en-US" dirty="0" err="1"/>
-              <a:t>http.head</a:t>
-            </a:r>
-            <a:endParaRPr lang="en-US" dirty="0"/>
-          </a:p>
-          <a:p>
-            <a:pPr lvl="1"/>
-            <a:r>
-              <a:rPr lang="en-US" dirty="0"/>
-              <a:t>$</a:t>
-            </a:r>
-            <a:r>
-              <a:rPr lang="en-US" dirty="0" err="1"/>
-              <a:t>http.post</a:t>
-            </a:r>
-            <a:endParaRPr lang="en-US" dirty="0"/>
-          </a:p>
-          <a:p>
-            <a:pPr lvl="1"/>
-            <a:r>
-              <a:rPr lang="en-US" dirty="0"/>
-              <a:t>$</a:t>
-            </a:r>
-            <a:r>
-              <a:rPr lang="en-US" dirty="0" err="1"/>
-              <a:t>http.put</a:t>
-            </a:r>
-            <a:endParaRPr lang="en-US" dirty="0"/>
-          </a:p>
-          <a:p>
-            <a:pPr lvl="1"/>
-            <a:r>
-              <a:rPr lang="en-US" dirty="0"/>
-              <a:t>$</a:t>
-            </a:r>
-            <a:r>
-              <a:rPr lang="en-US" dirty="0" err="1" smtClean="0"/>
-              <a:t>http.delete</a:t>
-            </a:r>
-            <a:endParaRPr lang="en-US" dirty="0"/>
+            <a:r>
+              <a:rPr lang="en-US" dirty="0" smtClean="0"/>
+              <a:t>Use $location to change the URL and redirect user</a:t>
+            </a:r>
           </a:p>
         </p:txBody>
       </p:sp>
     </p:spTree>
     <p:extLst>
       <p:ext uri="{BB962C8B-B14F-4D97-AF65-F5344CB8AC3E}">
-        <p14:creationId xmlns:p14="http://schemas.microsoft.com/office/powerpoint/2010/main" val="3070796785"/>
+        <p14:creationId xmlns:p14="http://schemas.microsoft.com/office/powerpoint/2010/main" val="3806772578"/>
       </p:ext>
     </p:extLst>
   </p:cSld>
@@ -4658,84 +4798,14 @@
           <a:bodyPr/>
           <a:lstStyle/>
           <a:p>
-            <a:r>
-              <a:rPr lang="en-US" dirty="0" smtClean="0"/>
-              <a:t>$resource</a:t>
-            </a:r>
-            <a:endParaRPr lang="en-US" dirty="0"/>
-          </a:p>
-        </p:txBody>
-      </p:sp>
-      <p:sp>
-        <p:nvSpPr>
-          <p:cNvPr id="3" name="Content Placeholder 2"/>
-          <p:cNvSpPr>
-            <a:spLocks noGrp="1"/>
-          </p:cNvSpPr>
-          <p:nvPr>
-            <p:ph sz="quarter" idx="10"/>
-          </p:nvPr>
-        </p:nvSpPr>
-        <p:spPr/>
-        <p:txBody>
-          <a:bodyPr/>
-          <a:lstStyle/>
-          <a:p>
-            <a:r>
-              <a:rPr lang="en-US" dirty="0" smtClean="0"/>
-              <a:t>No need for manual $http interactions</a:t>
-            </a:r>
-            <a:endParaRPr lang="en-US" dirty="0"/>
-          </a:p>
-          <a:p>
-            <a:endParaRPr lang="en-US" dirty="0" smtClean="0"/>
-          </a:p>
-          <a:p>
-            <a:r>
-              <a:rPr lang="en-US" dirty="0" smtClean="0"/>
-              <a:t>Easiest way to interact with </a:t>
-            </a:r>
-            <a:r>
-              <a:rPr lang="en-US" dirty="0" err="1" smtClean="0"/>
-              <a:t>RESTful</a:t>
-            </a:r>
-            <a:r>
-              <a:rPr lang="en-US" dirty="0" smtClean="0"/>
-              <a:t> endpoints</a:t>
-            </a:r>
-          </a:p>
-          <a:p>
-            <a:endParaRPr lang="en-US" dirty="0" smtClean="0"/>
-          </a:p>
-          <a:p>
-            <a:r>
-              <a:rPr lang="en-US" dirty="0" smtClean="0"/>
-              <a:t>Requires the </a:t>
-            </a:r>
-            <a:r>
-              <a:rPr lang="en-US" dirty="0" err="1" smtClean="0"/>
-              <a:t>ngResource</a:t>
-            </a:r>
-            <a:r>
-              <a:rPr lang="en-US" dirty="0" smtClean="0"/>
-              <a:t> module</a:t>
-            </a:r>
-          </a:p>
-          <a:p>
-            <a:endParaRPr lang="en-US" dirty="0"/>
-          </a:p>
-          <a:p>
-            <a:endParaRPr lang="en-US" dirty="0" smtClean="0"/>
-          </a:p>
-          <a:p>
-            <a:endParaRPr lang="en-US" dirty="0"/>
+            <a:endParaRPr lang="en-US"/>
           </a:p>
         </p:txBody>
       </p:sp>
     </p:spTree>
     <p:extLst>
       <p:ext uri="{BB962C8B-B14F-4D97-AF65-F5344CB8AC3E}">
-        <p14:creationId xmlns:p14="http://schemas.microsoft.com/office/powerpoint/2010/main" val="444165021"/>
+        <p14:creationId xmlns:p14="http://schemas.microsoft.com/office/powerpoint/2010/main" val="2494575201"/>
       </p:ext>
     </p:extLst>
   </p:cSld>
@@ -4764,7 +4834,7 @@
       </p:grpSpPr>
       <p:sp>
         <p:nvSpPr>
-          <p:cNvPr id="2" name="Text Placeholder 1"/>
+          <p:cNvPr id="5" name="Text Placeholder 4"/>
           <p:cNvSpPr>
             <a:spLocks noGrp="1"/>
           </p:cNvSpPr>
@@ -4779,7 +4849,7 @@
           <a:p>
             <a:r>
               <a:rPr lang="en-US" dirty="0" smtClean="0"/>
-              <a:t>Implementing &amp; Displaying Authentication</a:t>
+              <a:t>Services</a:t>
             </a:r>
             <a:endParaRPr lang="en-US" dirty="0"/>
           </a:p>
@@ -4787,7 +4857,7 @@
       </p:sp>
       <p:sp>
         <p:nvSpPr>
-          <p:cNvPr id="3" name="Subtitle 2"/>
+          <p:cNvPr id="4" name="Subtitle 3"/>
           <p:cNvSpPr>
             <a:spLocks noGrp="1"/>
           </p:cNvSpPr>
@@ -4800,14 +4870,14 @@
           <a:bodyPr/>
           <a:lstStyle/>
           <a:p>
-            <a:endParaRPr lang="en-US"/>
+            <a:endParaRPr lang="en-US" dirty="0"/>
           </a:p>
         </p:txBody>
       </p:sp>
     </p:spTree>
     <p:extLst>
       <p:ext uri="{BB962C8B-B14F-4D97-AF65-F5344CB8AC3E}">
-        <p14:creationId xmlns:p14="http://schemas.microsoft.com/office/powerpoint/2010/main" val="3710274791"/>
+        <p14:creationId xmlns:p14="http://schemas.microsoft.com/office/powerpoint/2010/main" val="1868946462"/>
       </p:ext>
     </p:extLst>
   </p:cSld>
@@ -5357,7 +5427,7 @@
   <a:extraClrSchemeLst/>
   <a:extLst>
     <a:ext uri="{05A4C25C-085E-4340-85A3-A5531E510DB2}">
-      <thm15:themeFamily xmlns="" xmlns:thm15="http://schemas.microsoft.com/office/thememl/2012/main" name="Office Theme" id="{62F939B6-93AF-4DB8-9C6B-D6C7DFDC589F}" vid="{4A3C46E8-61CC-4603-A589-7422A47A8E4A}"/>
+      <thm15:themeFamily xmlns:thm15="http://schemas.microsoft.com/office/thememl/2012/main" xmlns="" name="Office Theme" id="{62F939B6-93AF-4DB8-9C6B-D6C7DFDC589F}" vid="{4A3C46E8-61CC-4603-A589-7422A47A8E4A}"/>
     </a:ext>
   </a:extLst>
 </a:theme>
@@ -5618,7 +5688,7 @@
   <a:extraClrSchemeLst/>
   <a:extLst>
     <a:ext uri="{05A4C25C-085E-4340-85A3-A5531E510DB2}">
-      <thm15:themeFamily xmlns="" xmlns:thm15="http://schemas.microsoft.com/office/thememl/2012/main" name="Office Theme" id="{62F939B6-93AF-4DB8-9C6B-D6C7DFDC589F}" vid="{4A3C46E8-61CC-4603-A589-7422A47A8E4A}"/>
+      <thm15:themeFamily xmlns:thm15="http://schemas.microsoft.com/office/thememl/2012/main" xmlns="" name="Office Theme" id="{62F939B6-93AF-4DB8-9C6B-D6C7DFDC589F}" vid="{4A3C46E8-61CC-4603-A589-7422A47A8E4A}"/>
     </a:ext>
   </a:extLst>
 </a:theme>

</xml_diff>